<commit_message>
update about Dr. S info
</commit_message>
<xml_diff>
--- a/Data/cover_image.pptx
+++ b/Data/cover_image.pptx
@@ -259,7 +259,7 @@
           <a:p>
             <a:fld id="{D0F1932F-1C99-447E-95F3-773EBA18C860}" type="datetimeFigureOut">
               <a:rPr lang="en-US" smtClean="0"/>
-              <a:t>3/17/2022</a:t>
+              <a:t>3/21/22</a:t>
             </a:fld>
             <a:endParaRPr lang="en-US"/>
           </a:p>
@@ -457,7 +457,7 @@
           <a:p>
             <a:fld id="{D0F1932F-1C99-447E-95F3-773EBA18C860}" type="datetimeFigureOut">
               <a:rPr lang="en-US" smtClean="0"/>
-              <a:t>3/17/2022</a:t>
+              <a:t>3/21/22</a:t>
             </a:fld>
             <a:endParaRPr lang="en-US"/>
           </a:p>
@@ -665,7 +665,7 @@
           <a:p>
             <a:fld id="{D0F1932F-1C99-447E-95F3-773EBA18C860}" type="datetimeFigureOut">
               <a:rPr lang="en-US" smtClean="0"/>
-              <a:t>3/17/2022</a:t>
+              <a:t>3/21/22</a:t>
             </a:fld>
             <a:endParaRPr lang="en-US"/>
           </a:p>
@@ -863,7 +863,7 @@
           <a:p>
             <a:fld id="{D0F1932F-1C99-447E-95F3-773EBA18C860}" type="datetimeFigureOut">
               <a:rPr lang="en-US" smtClean="0"/>
-              <a:t>3/17/2022</a:t>
+              <a:t>3/21/22</a:t>
             </a:fld>
             <a:endParaRPr lang="en-US"/>
           </a:p>
@@ -1138,7 +1138,7 @@
           <a:p>
             <a:fld id="{D0F1932F-1C99-447E-95F3-773EBA18C860}" type="datetimeFigureOut">
               <a:rPr lang="en-US" smtClean="0"/>
-              <a:t>3/17/2022</a:t>
+              <a:t>3/21/22</a:t>
             </a:fld>
             <a:endParaRPr lang="en-US"/>
           </a:p>
@@ -1403,7 +1403,7 @@
           <a:p>
             <a:fld id="{D0F1932F-1C99-447E-95F3-773EBA18C860}" type="datetimeFigureOut">
               <a:rPr lang="en-US" smtClean="0"/>
-              <a:t>3/17/2022</a:t>
+              <a:t>3/21/22</a:t>
             </a:fld>
             <a:endParaRPr lang="en-US"/>
           </a:p>
@@ -1815,7 +1815,7 @@
           <a:p>
             <a:fld id="{D0F1932F-1C99-447E-95F3-773EBA18C860}" type="datetimeFigureOut">
               <a:rPr lang="en-US" smtClean="0"/>
-              <a:t>3/17/2022</a:t>
+              <a:t>3/21/22</a:t>
             </a:fld>
             <a:endParaRPr lang="en-US"/>
           </a:p>
@@ -1956,7 +1956,7 @@
           <a:p>
             <a:fld id="{D0F1932F-1C99-447E-95F3-773EBA18C860}" type="datetimeFigureOut">
               <a:rPr lang="en-US" smtClean="0"/>
-              <a:t>3/17/2022</a:t>
+              <a:t>3/21/22</a:t>
             </a:fld>
             <a:endParaRPr lang="en-US"/>
           </a:p>
@@ -2069,7 +2069,7 @@
           <a:p>
             <a:fld id="{D0F1932F-1C99-447E-95F3-773EBA18C860}" type="datetimeFigureOut">
               <a:rPr lang="en-US" smtClean="0"/>
-              <a:t>3/17/2022</a:t>
+              <a:t>3/21/22</a:t>
             </a:fld>
             <a:endParaRPr lang="en-US"/>
           </a:p>
@@ -2380,7 +2380,7 @@
           <a:p>
             <a:fld id="{D0F1932F-1C99-447E-95F3-773EBA18C860}" type="datetimeFigureOut">
               <a:rPr lang="en-US" smtClean="0"/>
-              <a:t>3/17/2022</a:t>
+              <a:t>3/21/22</a:t>
             </a:fld>
             <a:endParaRPr lang="en-US"/>
           </a:p>
@@ -2668,7 +2668,7 @@
           <a:p>
             <a:fld id="{D0F1932F-1C99-447E-95F3-773EBA18C860}" type="datetimeFigureOut">
               <a:rPr lang="en-US" smtClean="0"/>
-              <a:t>3/17/2022</a:t>
+              <a:t>3/21/22</a:t>
             </a:fld>
             <a:endParaRPr lang="en-US"/>
           </a:p>
@@ -2909,7 +2909,7 @@
           <a:p>
             <a:fld id="{D0F1932F-1C99-447E-95F3-773EBA18C860}" type="datetimeFigureOut">
               <a:rPr lang="en-US" smtClean="0"/>
-              <a:t>3/17/2022</a:t>
+              <a:t>3/21/22</a:t>
             </a:fld>
             <a:endParaRPr lang="en-US"/>
           </a:p>
@@ -3399,7 +3399,7 @@
                   <a:latin typeface="Arial" panose="020B0604020202020204" pitchFamily="34" charset="0"/>
                   <a:cs typeface="Arial" panose="020B0604020202020204" pitchFamily="34" charset="0"/>
                 </a:rPr>
-                <a:t>Molecular Phenomena at Aqueous Interfaces</a:t>
+                <a:t>Molecular Phenomena in Aqueous Systems</a:t>
               </a:r>
             </a:p>
           </p:txBody>
@@ -3515,7 +3515,7 @@
                   <a:latin typeface="Arial" panose="020B0604020202020204" pitchFamily="34" charset="0"/>
                   <a:cs typeface="Arial" panose="020B0604020202020204" pitchFamily="34" charset="0"/>
                 </a:rPr>
-                <a:t>Advanced methods and software to study mechanisms</a:t>
+                <a:t>Advanced Methods and Software to Study Mechanisms</a:t>
               </a:r>
             </a:p>
           </p:txBody>
@@ -3940,9 +3940,9 @@
           </p:nvGrpSpPr>
           <p:grpSpPr>
             <a:xfrm>
-              <a:off x="7628589" y="1764726"/>
+              <a:off x="7693905" y="2004212"/>
               <a:ext cx="974558" cy="962013"/>
-              <a:chOff x="7650079" y="1825389"/>
+              <a:chOff x="7715395" y="2064875"/>
               <a:chExt cx="974558" cy="962013"/>
             </a:xfrm>
           </p:grpSpPr>
@@ -3977,7 +3977,7 @@
             </p:blipFill>
             <p:spPr>
               <a:xfrm>
-                <a:off x="7666189" y="1860883"/>
+                <a:off x="7742500" y="2085707"/>
                 <a:ext cx="920347" cy="920347"/>
               </a:xfrm>
               <a:prstGeom prst="rect">
@@ -3999,7 +3999,7 @@
             </p:nvSpPr>
             <p:spPr>
               <a:xfrm>
-                <a:off x="7650079" y="1825389"/>
+                <a:off x="7715395" y="2064875"/>
                 <a:ext cx="974558" cy="962013"/>
               </a:xfrm>
               <a:prstGeom prst="rect">

</xml_diff>

<commit_message>
fix Read Abstract button on Zhou's publication
</commit_message>
<xml_diff>
--- a/Data/cover_image.pptx
+++ b/Data/cover_image.pptx
@@ -5,14 +5,16 @@
     <p:sldMasterId id="2147483708" r:id="rId1"/>
   </p:sldMasterIdLst>
   <p:notesMasterIdLst>
-    <p:notesMasterId r:id="rId7"/>
+    <p:notesMasterId r:id="rId9"/>
   </p:notesMasterIdLst>
   <p:sldIdLst>
     <p:sldId id="260" r:id="rId2"/>
     <p:sldId id="263" r:id="rId3"/>
     <p:sldId id="269" r:id="rId4"/>
-    <p:sldId id="272" r:id="rId5"/>
-    <p:sldId id="271" r:id="rId6"/>
+    <p:sldId id="273" r:id="rId5"/>
+    <p:sldId id="272" r:id="rId6"/>
+    <p:sldId id="274" r:id="rId7"/>
+    <p:sldId id="271" r:id="rId8"/>
   </p:sldIdLst>
   <p:sldSz cx="22758400" cy="12801600"/>
   <p:notesSz cx="6858000" cy="9144000"/>
@@ -212,7 +214,7 @@
           <a:p>
             <a:fld id="{D6EBDCDB-5C13-8D41-86D7-695E06C502A8}" type="datetimeFigureOut">
               <a:rPr lang="en-US" smtClean="0"/>
-              <a:t>10/17/22</a:t>
+              <a:t>3/8/23</a:t>
             </a:fld>
             <a:endParaRPr lang="en-US"/>
           </a:p>
@@ -699,7 +701,7 @@
           <a:p>
             <a:fld id="{D0F1932F-1C99-447E-95F3-773EBA18C860}" type="datetimeFigureOut">
               <a:rPr lang="en-US" smtClean="0"/>
-              <a:t>10/17/22</a:t>
+              <a:t>3/8/23</a:t>
             </a:fld>
             <a:endParaRPr lang="en-US"/>
           </a:p>
@@ -869,7 +871,7 @@
           <a:p>
             <a:fld id="{D0F1932F-1C99-447E-95F3-773EBA18C860}" type="datetimeFigureOut">
               <a:rPr lang="en-US" smtClean="0"/>
-              <a:t>10/17/22</a:t>
+              <a:t>3/8/23</a:t>
             </a:fld>
             <a:endParaRPr lang="en-US"/>
           </a:p>
@@ -1049,7 +1051,7 @@
           <a:p>
             <a:fld id="{D0F1932F-1C99-447E-95F3-773EBA18C860}" type="datetimeFigureOut">
               <a:rPr lang="en-US" smtClean="0"/>
-              <a:t>10/17/22</a:t>
+              <a:t>3/8/23</a:t>
             </a:fld>
             <a:endParaRPr lang="en-US"/>
           </a:p>
@@ -1219,7 +1221,7 @@
           <a:p>
             <a:fld id="{D0F1932F-1C99-447E-95F3-773EBA18C860}" type="datetimeFigureOut">
               <a:rPr lang="en-US" smtClean="0"/>
-              <a:t>10/17/22</a:t>
+              <a:t>3/8/23</a:t>
             </a:fld>
             <a:endParaRPr lang="en-US"/>
           </a:p>
@@ -1465,7 +1467,7 @@
           <a:p>
             <a:fld id="{D0F1932F-1C99-447E-95F3-773EBA18C860}" type="datetimeFigureOut">
               <a:rPr lang="en-US" smtClean="0"/>
-              <a:t>10/17/22</a:t>
+              <a:t>3/8/23</a:t>
             </a:fld>
             <a:endParaRPr lang="en-US"/>
           </a:p>
@@ -1697,7 +1699,7 @@
           <a:p>
             <a:fld id="{D0F1932F-1C99-447E-95F3-773EBA18C860}" type="datetimeFigureOut">
               <a:rPr lang="en-US" smtClean="0"/>
-              <a:t>10/17/22</a:t>
+              <a:t>3/8/23</a:t>
             </a:fld>
             <a:endParaRPr lang="en-US"/>
           </a:p>
@@ -2064,7 +2066,7 @@
           <a:p>
             <a:fld id="{D0F1932F-1C99-447E-95F3-773EBA18C860}" type="datetimeFigureOut">
               <a:rPr lang="en-US" smtClean="0"/>
-              <a:t>10/17/22</a:t>
+              <a:t>3/8/23</a:t>
             </a:fld>
             <a:endParaRPr lang="en-US"/>
           </a:p>
@@ -2182,7 +2184,7 @@
           <a:p>
             <a:fld id="{D0F1932F-1C99-447E-95F3-773EBA18C860}" type="datetimeFigureOut">
               <a:rPr lang="en-US" smtClean="0"/>
-              <a:t>10/17/22</a:t>
+              <a:t>3/8/23</a:t>
             </a:fld>
             <a:endParaRPr lang="en-US"/>
           </a:p>
@@ -2277,7 +2279,7 @@
           <a:p>
             <a:fld id="{D0F1932F-1C99-447E-95F3-773EBA18C860}" type="datetimeFigureOut">
               <a:rPr lang="en-US" smtClean="0"/>
-              <a:t>10/17/22</a:t>
+              <a:t>3/8/23</a:t>
             </a:fld>
             <a:endParaRPr lang="en-US"/>
           </a:p>
@@ -2554,7 +2556,7 @@
           <a:p>
             <a:fld id="{D0F1932F-1C99-447E-95F3-773EBA18C860}" type="datetimeFigureOut">
               <a:rPr lang="en-US" smtClean="0"/>
-              <a:t>10/17/22</a:t>
+              <a:t>3/8/23</a:t>
             </a:fld>
             <a:endParaRPr lang="en-US"/>
           </a:p>
@@ -2811,7 +2813,7 @@
           <a:p>
             <a:fld id="{D0F1932F-1C99-447E-95F3-773EBA18C860}" type="datetimeFigureOut">
               <a:rPr lang="en-US" smtClean="0"/>
-              <a:t>10/17/22</a:t>
+              <a:t>3/8/23</a:t>
             </a:fld>
             <a:endParaRPr lang="en-US"/>
           </a:p>
@@ -3024,7 +3026,7 @@
           <a:p>
             <a:fld id="{D0F1932F-1C99-447E-95F3-773EBA18C860}" type="datetimeFigureOut">
               <a:rPr lang="en-US" smtClean="0"/>
-              <a:t>10/17/22</a:t>
+              <a:t>3/8/23</a:t>
             </a:fld>
             <a:endParaRPr lang="en-US"/>
           </a:p>
@@ -4859,6 +4861,208 @@
       </p:grpSpPr>
       <p:grpSp>
         <p:nvGrpSpPr>
+          <p:cNvPr id="5" name="Group 4">
+            <a:extLst>
+              <a:ext uri="{FF2B5EF4-FFF2-40B4-BE49-F238E27FC236}">
+                <a16:creationId xmlns:a16="http://schemas.microsoft.com/office/drawing/2014/main" id="{D9B378D7-43DB-5748-4C90-525B8F34C2EC}"/>
+              </a:ext>
+            </a:extLst>
+          </p:cNvPr>
+          <p:cNvGrpSpPr/>
+          <p:nvPr/>
+        </p:nvGrpSpPr>
+        <p:grpSpPr>
+          <a:xfrm>
+            <a:off x="7493000" y="2514600"/>
+            <a:ext cx="7772400" cy="7772400"/>
+            <a:chOff x="7493000" y="2514600"/>
+            <a:chExt cx="7772400" cy="7772400"/>
+          </a:xfrm>
+        </p:grpSpPr>
+        <p:grpSp>
+          <p:nvGrpSpPr>
+            <p:cNvPr id="6" name="Group 5">
+              <a:extLst>
+                <a:ext uri="{FF2B5EF4-FFF2-40B4-BE49-F238E27FC236}">
+                  <a16:creationId xmlns:a16="http://schemas.microsoft.com/office/drawing/2014/main" id="{68D06400-1F41-1ECC-EF17-8190AA45E36D}"/>
+                </a:ext>
+              </a:extLst>
+            </p:cNvPr>
+            <p:cNvGrpSpPr/>
+            <p:nvPr/>
+          </p:nvGrpSpPr>
+          <p:grpSpPr>
+            <a:xfrm>
+              <a:off x="7493000" y="2514600"/>
+              <a:ext cx="7772400" cy="7772400"/>
+              <a:chOff x="7493000" y="2514600"/>
+              <a:chExt cx="7772400" cy="7772400"/>
+            </a:xfrm>
+          </p:grpSpPr>
+          <p:pic>
+            <p:nvPicPr>
+              <p:cNvPr id="3" name="Picture 2" descr="Diagram&#10;&#10;Description automatically generated">
+                <a:extLst>
+                  <a:ext uri="{FF2B5EF4-FFF2-40B4-BE49-F238E27FC236}">
+                    <a16:creationId xmlns:a16="http://schemas.microsoft.com/office/drawing/2014/main" id="{12C5892C-7498-61E8-1E6E-639CC2C02EBB}"/>
+                  </a:ext>
+                </a:extLst>
+              </p:cNvPr>
+              <p:cNvPicPr>
+                <a:picLocks noChangeAspect="1"/>
+              </p:cNvPicPr>
+              <p:nvPr/>
+            </p:nvPicPr>
+            <p:blipFill>
+              <a:blip r:embed="rId2">
+                <a:extLst>
+                  <a:ext uri="{28A0092B-C50C-407E-A947-70E740481C1C}">
+                    <a14:useLocalDpi xmlns:a14="http://schemas.microsoft.com/office/drawing/2010/main" val="0"/>
+                  </a:ext>
+                </a:extLst>
+              </a:blip>
+              <a:stretch>
+                <a:fillRect/>
+              </a:stretch>
+            </p:blipFill>
+            <p:spPr>
+              <a:xfrm>
+                <a:off x="7493000" y="2514600"/>
+                <a:ext cx="7772400" cy="7772400"/>
+              </a:xfrm>
+              <a:prstGeom prst="rect">
+                <a:avLst/>
+              </a:prstGeom>
+            </p:spPr>
+          </p:pic>
+          <p:sp>
+            <p:nvSpPr>
+              <p:cNvPr id="4" name="Rectangle 3">
+                <a:extLst>
+                  <a:ext uri="{FF2B5EF4-FFF2-40B4-BE49-F238E27FC236}">
+                    <a16:creationId xmlns:a16="http://schemas.microsoft.com/office/drawing/2014/main" id="{4E296352-8E0D-7D06-B619-43987A723C1C}"/>
+                  </a:ext>
+                </a:extLst>
+              </p:cNvPr>
+              <p:cNvSpPr/>
+              <p:nvPr/>
+            </p:nvSpPr>
+            <p:spPr>
+              <a:xfrm rot="155493">
+                <a:off x="8264469" y="4477702"/>
+                <a:ext cx="6587852" cy="3517100"/>
+              </a:xfrm>
+              <a:prstGeom prst="rect">
+                <a:avLst/>
+              </a:prstGeom>
+              <a:noFill/>
+            </p:spPr>
+            <p:txBody>
+              <a:bodyPr wrap="none" lIns="91440" tIns="45720" rIns="91440" bIns="45720">
+                <a:prstTxWarp prst="textArchUp">
+                  <a:avLst>
+                    <a:gd name="adj" fmla="val 13368903"/>
+                  </a:avLst>
+                </a:prstTxWarp>
+                <a:spAutoFit/>
+              </a:bodyPr>
+              <a:lstStyle/>
+              <a:p>
+                <a:pPr algn="ctr"/>
+                <a:r>
+                  <a:rPr lang="en-US" sz="13800" dirty="0">
+                    <a:ln w="0"/>
+                    <a:effectLst>
+                      <a:outerShdw blurRad="38100" dist="19050" dir="2700000" algn="tl" rotWithShape="0">
+                        <a:schemeClr val="dk1">
+                          <a:alpha val="40000"/>
+                        </a:schemeClr>
+                      </a:outerShdw>
+                    </a:effectLst>
+                    <a:latin typeface="Nordique Inline" pitchFamily="2" charset="77"/>
+                  </a:rPr>
+                  <a:t>SAMPEL</a:t>
+                </a:r>
+              </a:p>
+            </p:txBody>
+          </p:sp>
+        </p:grpSp>
+        <p:sp>
+          <p:nvSpPr>
+            <p:cNvPr id="2" name="TextBox 1">
+              <a:extLst>
+                <a:ext uri="{FF2B5EF4-FFF2-40B4-BE49-F238E27FC236}">
+                  <a16:creationId xmlns:a16="http://schemas.microsoft.com/office/drawing/2014/main" id="{30EAAE46-838A-ADE6-8B2D-788951EE2963}"/>
+                </a:ext>
+              </a:extLst>
+            </p:cNvPr>
+            <p:cNvSpPr txBox="1"/>
+            <p:nvPr/>
+          </p:nvSpPr>
+          <p:spPr>
+            <a:xfrm rot="21249662">
+              <a:off x="9080638" y="5714756"/>
+              <a:ext cx="4151322" cy="667512"/>
+            </a:xfrm>
+            <a:prstGeom prst="rect">
+              <a:avLst/>
+            </a:prstGeom>
+            <a:noFill/>
+          </p:spPr>
+          <p:txBody>
+            <a:bodyPr wrap="square" rtlCol="0">
+              <a:prstTxWarp prst="textArchUp">
+                <a:avLst>
+                  <a:gd name="adj" fmla="val 10872908"/>
+                </a:avLst>
+              </a:prstTxWarp>
+              <a:spAutoFit/>
+            </a:bodyPr>
+            <a:lstStyle/>
+            <a:p>
+              <a:r>
+                <a:rPr lang="en-US" sz="2800" b="1" dirty="0">
+                  <a:latin typeface="Abadi MT Condensed Extra Bold" panose="020B0306030101010103" pitchFamily="34" charset="77"/>
+                  <a:cs typeface="Amasis MT Pro Medium" panose="020F0502020204030204" pitchFamily="34" charset="0"/>
+                </a:rPr>
+                <a:t>sarupriagroup.github.io</a:t>
+              </a:r>
+            </a:p>
+          </p:txBody>
+        </p:sp>
+      </p:grpSp>
+    </p:spTree>
+    <p:extLst>
+      <p:ext uri="{BB962C8B-B14F-4D97-AF65-F5344CB8AC3E}">
+        <p14:creationId xmlns:p14="http://schemas.microsoft.com/office/powerpoint/2010/main" val="2519616292"/>
+      </p:ext>
+    </p:extLst>
+  </p:cSld>
+  <p:clrMapOvr>
+    <a:masterClrMapping/>
+  </p:clrMapOvr>
+</p:sld>
+</file>
+
+<file path=ppt/slides/slide5.xml><?xml version="1.0" encoding="utf-8"?>
+<p:sld xmlns:a="http://schemas.openxmlformats.org/drawingml/2006/main" xmlns:r="http://schemas.openxmlformats.org/officeDocument/2006/relationships" xmlns:p="http://schemas.openxmlformats.org/presentationml/2006/main">
+  <p:cSld>
+    <p:spTree>
+      <p:nvGrpSpPr>
+        <p:cNvPr id="1" name=""/>
+        <p:cNvGrpSpPr/>
+        <p:nvPr/>
+      </p:nvGrpSpPr>
+      <p:grpSpPr>
+        <a:xfrm>
+          <a:off x="0" y="0"/>
+          <a:ext cx="0" cy="0"/>
+          <a:chOff x="0" y="0"/>
+          <a:chExt cx="0" cy="0"/>
+        </a:xfrm>
+      </p:grpSpPr>
+      <p:grpSp>
+        <p:nvGrpSpPr>
           <p:cNvPr id="2" name="Group 1">
             <a:extLst>
               <a:ext uri="{FF2B5EF4-FFF2-40B4-BE49-F238E27FC236}">
@@ -5924,7 +6128,1155 @@
 </p:sld>
 </file>
 
-<file path=ppt/slides/slide5.xml><?xml version="1.0" encoding="utf-8"?>
+<file path=ppt/slides/slide6.xml><?xml version="1.0" encoding="utf-8"?>
+<p:sld xmlns:a="http://schemas.openxmlformats.org/drawingml/2006/main" xmlns:r="http://schemas.openxmlformats.org/officeDocument/2006/relationships" xmlns:p="http://schemas.openxmlformats.org/presentationml/2006/main">
+  <p:cSld>
+    <p:spTree>
+      <p:nvGrpSpPr>
+        <p:cNvPr id="1" name=""/>
+        <p:cNvGrpSpPr/>
+        <p:nvPr/>
+      </p:nvGrpSpPr>
+      <p:grpSpPr>
+        <a:xfrm>
+          <a:off x="0" y="0"/>
+          <a:ext cx="0" cy="0"/>
+          <a:chOff x="0" y="0"/>
+          <a:chExt cx="0" cy="0"/>
+        </a:xfrm>
+      </p:grpSpPr>
+      <p:grpSp>
+        <p:nvGrpSpPr>
+          <p:cNvPr id="2" name="Group 1">
+            <a:extLst>
+              <a:ext uri="{FF2B5EF4-FFF2-40B4-BE49-F238E27FC236}">
+                <a16:creationId xmlns:a16="http://schemas.microsoft.com/office/drawing/2014/main" id="{9F18E17C-DBAE-CFB5-6675-3F8BD57CDAED}"/>
+              </a:ext>
+            </a:extLst>
+          </p:cNvPr>
+          <p:cNvGrpSpPr/>
+          <p:nvPr/>
+        </p:nvGrpSpPr>
+        <p:grpSpPr>
+          <a:xfrm>
+            <a:off x="7210612" y="2460812"/>
+            <a:ext cx="8081682" cy="8081682"/>
+            <a:chOff x="7493000" y="2514600"/>
+            <a:chExt cx="7772400" cy="7772400"/>
+          </a:xfrm>
+        </p:grpSpPr>
+        <p:grpSp>
+          <p:nvGrpSpPr>
+            <p:cNvPr id="3" name="Group 2">
+              <a:extLst>
+                <a:ext uri="{FF2B5EF4-FFF2-40B4-BE49-F238E27FC236}">
+                  <a16:creationId xmlns:a16="http://schemas.microsoft.com/office/drawing/2014/main" id="{959A54FD-E5E3-3DE3-9DF3-44799FEE8107}"/>
+                </a:ext>
+              </a:extLst>
+            </p:cNvPr>
+            <p:cNvGrpSpPr/>
+            <p:nvPr/>
+          </p:nvGrpSpPr>
+          <p:grpSpPr>
+            <a:xfrm>
+              <a:off x="7493000" y="2514600"/>
+              <a:ext cx="7772400" cy="7772400"/>
+              <a:chOff x="7493000" y="2514600"/>
+              <a:chExt cx="7772400" cy="7772400"/>
+            </a:xfrm>
+          </p:grpSpPr>
+          <p:pic>
+            <p:nvPicPr>
+              <p:cNvPr id="6" name="Picture 5" descr="Diagram&#10;&#10;Description automatically generated">
+                <a:extLst>
+                  <a:ext uri="{FF2B5EF4-FFF2-40B4-BE49-F238E27FC236}">
+                    <a16:creationId xmlns:a16="http://schemas.microsoft.com/office/drawing/2014/main" id="{736D3E21-682F-B78E-C3DC-AD25A42D829A}"/>
+                  </a:ext>
+                </a:extLst>
+              </p:cNvPr>
+              <p:cNvPicPr>
+                <a:picLocks noChangeAspect="1"/>
+              </p:cNvPicPr>
+              <p:nvPr/>
+            </p:nvPicPr>
+            <p:blipFill>
+              <a:blip r:embed="rId2">
+                <a:extLst>
+                  <a:ext uri="{28A0092B-C50C-407E-A947-70E740481C1C}">
+                    <a14:useLocalDpi xmlns:a14="http://schemas.microsoft.com/office/drawing/2010/main" val="0"/>
+                  </a:ext>
+                </a:extLst>
+              </a:blip>
+              <a:stretch>
+                <a:fillRect/>
+              </a:stretch>
+            </p:blipFill>
+            <p:spPr>
+              <a:xfrm>
+                <a:off x="7493000" y="2514600"/>
+                <a:ext cx="7772400" cy="7772400"/>
+              </a:xfrm>
+              <a:prstGeom prst="rect">
+                <a:avLst/>
+              </a:prstGeom>
+            </p:spPr>
+          </p:pic>
+          <p:sp>
+            <p:nvSpPr>
+              <p:cNvPr id="7" name="Rectangle 6">
+                <a:extLst>
+                  <a:ext uri="{FF2B5EF4-FFF2-40B4-BE49-F238E27FC236}">
+                    <a16:creationId xmlns:a16="http://schemas.microsoft.com/office/drawing/2014/main" id="{B5A0B7B4-B62D-387F-B146-FCAFBF866611}"/>
+                  </a:ext>
+                </a:extLst>
+              </p:cNvPr>
+              <p:cNvSpPr/>
+              <p:nvPr/>
+            </p:nvSpPr>
+            <p:spPr>
+              <a:xfrm rot="155493">
+                <a:off x="8264469" y="4477702"/>
+                <a:ext cx="6587852" cy="3517100"/>
+              </a:xfrm>
+              <a:prstGeom prst="rect">
+                <a:avLst/>
+              </a:prstGeom>
+              <a:noFill/>
+            </p:spPr>
+            <p:txBody>
+              <a:bodyPr wrap="none" lIns="91440" tIns="45720" rIns="91440" bIns="45720">
+                <a:prstTxWarp prst="textArchUp">
+                  <a:avLst>
+                    <a:gd name="adj" fmla="val 13368903"/>
+                  </a:avLst>
+                </a:prstTxWarp>
+                <a:spAutoFit/>
+              </a:bodyPr>
+              <a:lstStyle/>
+              <a:p>
+                <a:pPr algn="ctr"/>
+                <a:r>
+                  <a:rPr lang="en-US" sz="13800" dirty="0">
+                    <a:ln w="0"/>
+                    <a:effectLst>
+                      <a:outerShdw blurRad="38100" dist="19050" dir="2700000" algn="tl" rotWithShape="0">
+                        <a:schemeClr val="dk1">
+                          <a:alpha val="40000"/>
+                        </a:schemeClr>
+                      </a:outerShdw>
+                    </a:effectLst>
+                    <a:latin typeface="Nordique Inline" pitchFamily="2" charset="77"/>
+                  </a:rPr>
+                  <a:t>SAMPEL</a:t>
+                </a:r>
+              </a:p>
+            </p:txBody>
+          </p:sp>
+        </p:grpSp>
+        <p:sp>
+          <p:nvSpPr>
+            <p:cNvPr id="5" name="TextBox 4">
+              <a:extLst>
+                <a:ext uri="{FF2B5EF4-FFF2-40B4-BE49-F238E27FC236}">
+                  <a16:creationId xmlns:a16="http://schemas.microsoft.com/office/drawing/2014/main" id="{B70D3FBB-AFE2-6B8A-37B5-B1F1422C2D6C}"/>
+                </a:ext>
+              </a:extLst>
+            </p:cNvPr>
+            <p:cNvSpPr txBox="1"/>
+            <p:nvPr/>
+          </p:nvSpPr>
+          <p:spPr>
+            <a:xfrm rot="21249662">
+              <a:off x="9080638" y="5714756"/>
+              <a:ext cx="4151322" cy="667512"/>
+            </a:xfrm>
+            <a:prstGeom prst="rect">
+              <a:avLst/>
+            </a:prstGeom>
+            <a:noFill/>
+          </p:spPr>
+          <p:txBody>
+            <a:bodyPr wrap="square" rtlCol="0">
+              <a:prstTxWarp prst="textArchUp">
+                <a:avLst>
+                  <a:gd name="adj" fmla="val 10872908"/>
+                </a:avLst>
+              </a:prstTxWarp>
+              <a:spAutoFit/>
+            </a:bodyPr>
+            <a:lstStyle/>
+            <a:p>
+              <a:r>
+                <a:rPr lang="en-US" sz="2800" b="1" dirty="0">
+                  <a:latin typeface="Abadi MT Condensed Extra Bold" panose="020B0306030101010103" pitchFamily="34" charset="77"/>
+                  <a:cs typeface="Amasis MT Pro Medium" panose="020F0502020204030204" pitchFamily="34" charset="0"/>
+                </a:rPr>
+                <a:t>sarupriagroup.github.io</a:t>
+              </a:r>
+            </a:p>
+          </p:txBody>
+        </p:sp>
+      </p:grpSp>
+      <p:sp>
+        <p:nvSpPr>
+          <p:cNvPr id="31" name="TextBox 30">
+            <a:extLst>
+              <a:ext uri="{FF2B5EF4-FFF2-40B4-BE49-F238E27FC236}">
+                <a16:creationId xmlns:a16="http://schemas.microsoft.com/office/drawing/2014/main" id="{A324253B-3079-DB80-31CE-BED279E26648}"/>
+              </a:ext>
+            </a:extLst>
+          </p:cNvPr>
+          <p:cNvSpPr txBox="1"/>
+          <p:nvPr/>
+        </p:nvSpPr>
+        <p:spPr>
+          <a:xfrm rot="3859121">
+            <a:off x="2268776" y="13847"/>
+            <a:ext cx="11509921" cy="16082584"/>
+          </a:xfrm>
+          <a:prstGeom prst="rect">
+            <a:avLst/>
+          </a:prstGeom>
+          <a:noFill/>
+        </p:spPr>
+        <p:txBody>
+          <a:bodyPr wrap="square">
+            <a:prstTxWarp prst="textArchUp">
+              <a:avLst>
+                <a:gd name="adj" fmla="val 11065984"/>
+              </a:avLst>
+            </a:prstTxWarp>
+            <a:spAutoFit/>
+          </a:bodyPr>
+          <a:lstStyle/>
+          <a:p>
+            <a:pPr algn="ctr"/>
+            <a:r>
+              <a:rPr lang="en-US" sz="5400" b="1" dirty="0">
+                <a:solidFill>
+                  <a:srgbClr val="780019"/>
+                </a:solidFill>
+                <a:latin typeface="Trebuchet MS" panose="020B0703020202090204" pitchFamily="34" charset="0"/>
+                <a:cs typeface="Arial" panose="020B0604020202020204" pitchFamily="34" charset="0"/>
+              </a:rPr>
+              <a:t>Advanced Sampling </a:t>
+            </a:r>
+          </a:p>
+          <a:p>
+            <a:pPr algn="ctr"/>
+            <a:r>
+              <a:rPr lang="en-US" sz="5400" b="1" dirty="0">
+                <a:solidFill>
+                  <a:srgbClr val="780019"/>
+                </a:solidFill>
+                <a:latin typeface="Trebuchet MS" panose="020B0703020202090204" pitchFamily="34" charset="0"/>
+                <a:cs typeface="Arial" panose="020B0604020202020204" pitchFamily="34" charset="0"/>
+              </a:rPr>
+              <a:t>Methods &amp; Software</a:t>
+            </a:r>
+          </a:p>
+        </p:txBody>
+      </p:sp>
+      <p:sp>
+        <p:nvSpPr>
+          <p:cNvPr id="33" name="TextBox 32">
+            <a:extLst>
+              <a:ext uri="{FF2B5EF4-FFF2-40B4-BE49-F238E27FC236}">
+                <a16:creationId xmlns:a16="http://schemas.microsoft.com/office/drawing/2014/main" id="{E1E80B9A-0038-21E7-34A0-0493C3E1EE87}"/>
+              </a:ext>
+            </a:extLst>
+          </p:cNvPr>
+          <p:cNvSpPr txBox="1"/>
+          <p:nvPr/>
+        </p:nvSpPr>
+        <p:spPr>
+          <a:xfrm rot="21423233">
+            <a:off x="5751331" y="570816"/>
+            <a:ext cx="11592857" cy="10340062"/>
+          </a:xfrm>
+          <a:prstGeom prst="rect">
+            <a:avLst/>
+          </a:prstGeom>
+          <a:noFill/>
+        </p:spPr>
+        <p:txBody>
+          <a:bodyPr wrap="square">
+            <a:prstTxWarp prst="textArchDown">
+              <a:avLst>
+                <a:gd name="adj" fmla="val 21388171"/>
+              </a:avLst>
+            </a:prstTxWarp>
+            <a:spAutoFit/>
+          </a:bodyPr>
+          <a:lstStyle/>
+          <a:p>
+            <a:pPr algn="ctr"/>
+            <a:r>
+              <a:rPr lang="en-US" sz="5400" b="1" dirty="0">
+                <a:solidFill>
+                  <a:srgbClr val="780019"/>
+                </a:solidFill>
+                <a:latin typeface="Trebuchet MS" panose="020B0703020202090204" pitchFamily="34" charset="0"/>
+                <a:cs typeface="Arial" panose="020B0604020202020204" pitchFamily="34" charset="0"/>
+              </a:rPr>
+              <a:t>Molecular Simulations </a:t>
+            </a:r>
+          </a:p>
+          <a:p>
+            <a:pPr algn="ctr"/>
+            <a:r>
+              <a:rPr lang="en-US" sz="5400" b="1" dirty="0">
+                <a:solidFill>
+                  <a:srgbClr val="780019"/>
+                </a:solidFill>
+                <a:latin typeface="Trebuchet MS" panose="020B0703020202090204" pitchFamily="34" charset="0"/>
+                <a:cs typeface="Arial" panose="020B0604020202020204" pitchFamily="34" charset="0"/>
+              </a:rPr>
+              <a:t>&amp; Machine Learning</a:t>
+            </a:r>
+          </a:p>
+        </p:txBody>
+      </p:sp>
+      <p:sp>
+        <p:nvSpPr>
+          <p:cNvPr id="4" name="Oval 3">
+            <a:extLst>
+              <a:ext uri="{FF2B5EF4-FFF2-40B4-BE49-F238E27FC236}">
+                <a16:creationId xmlns:a16="http://schemas.microsoft.com/office/drawing/2014/main" id="{E5EA3ADA-1396-9DFE-E58E-E82FB3039D58}"/>
+              </a:ext>
+            </a:extLst>
+          </p:cNvPr>
+          <p:cNvSpPr/>
+          <p:nvPr/>
+        </p:nvSpPr>
+        <p:spPr>
+          <a:xfrm>
+            <a:off x="5202254" y="214464"/>
+            <a:ext cx="12314339" cy="12338967"/>
+          </a:xfrm>
+          <a:prstGeom prst="ellipse">
+            <a:avLst/>
+          </a:prstGeom>
+          <a:noFill/>
+          <a:ln w="254000">
+            <a:solidFill>
+              <a:srgbClr val="FFCC33"/>
+            </a:solidFill>
+          </a:ln>
+        </p:spPr>
+        <p:style>
+          <a:lnRef idx="0">
+            <a:scrgbClr r="0" g="0" b="0"/>
+          </a:lnRef>
+          <a:fillRef idx="0">
+            <a:scrgbClr r="0" g="0" b="0"/>
+          </a:fillRef>
+          <a:effectRef idx="0">
+            <a:scrgbClr r="0" g="0" b="0"/>
+          </a:effectRef>
+          <a:fontRef idx="minor">
+            <a:schemeClr val="accent1"/>
+          </a:fontRef>
+        </p:style>
+        <p:txBody>
+          <a:bodyPr rtlCol="0" anchor="ctr"/>
+          <a:lstStyle/>
+          <a:p>
+            <a:pPr algn="ctr"/>
+            <a:endParaRPr lang="en-US" dirty="0"/>
+          </a:p>
+        </p:txBody>
+      </p:sp>
+      <p:cxnSp>
+        <p:nvCxnSpPr>
+          <p:cNvPr id="16" name="Straight Connector 15">
+            <a:extLst>
+              <a:ext uri="{FF2B5EF4-FFF2-40B4-BE49-F238E27FC236}">
+                <a16:creationId xmlns:a16="http://schemas.microsoft.com/office/drawing/2014/main" id="{C805818F-6D78-E32A-AE6A-3C2DDE9E9D77}"/>
+              </a:ext>
+            </a:extLst>
+          </p:cNvPr>
+          <p:cNvCxnSpPr>
+            <a:cxnSpLocks/>
+            <a:endCxn id="4" idx="0"/>
+          </p:cNvCxnSpPr>
+          <p:nvPr/>
+        </p:nvCxnSpPr>
+        <p:spPr>
+          <a:xfrm flipV="1">
+            <a:off x="11359424" y="214464"/>
+            <a:ext cx="0" cy="2563015"/>
+          </a:xfrm>
+          <a:prstGeom prst="line">
+            <a:avLst/>
+          </a:prstGeom>
+          <a:ln w="317500">
+            <a:solidFill>
+              <a:srgbClr val="FFCC33"/>
+            </a:solidFill>
+          </a:ln>
+        </p:spPr>
+        <p:style>
+          <a:lnRef idx="1">
+            <a:schemeClr val="accent1"/>
+          </a:lnRef>
+          <a:fillRef idx="0">
+            <a:schemeClr val="accent1"/>
+          </a:fillRef>
+          <a:effectRef idx="0">
+            <a:schemeClr val="accent1"/>
+          </a:effectRef>
+          <a:fontRef idx="minor">
+            <a:schemeClr val="tx1"/>
+          </a:fontRef>
+        </p:style>
+      </p:cxnSp>
+      <p:cxnSp>
+        <p:nvCxnSpPr>
+          <p:cNvPr id="18" name="Straight Connector 17">
+            <a:extLst>
+              <a:ext uri="{FF2B5EF4-FFF2-40B4-BE49-F238E27FC236}">
+                <a16:creationId xmlns:a16="http://schemas.microsoft.com/office/drawing/2014/main" id="{9AB4E515-415A-29C4-7E07-2AE784781A03}"/>
+              </a:ext>
+            </a:extLst>
+          </p:cNvPr>
+          <p:cNvCxnSpPr>
+            <a:cxnSpLocks/>
+          </p:cNvCxnSpPr>
+          <p:nvPr/>
+        </p:nvCxnSpPr>
+        <p:spPr>
+          <a:xfrm flipV="1">
+            <a:off x="6200828" y="8363415"/>
+            <a:ext cx="2028772" cy="1477195"/>
+          </a:xfrm>
+          <a:prstGeom prst="line">
+            <a:avLst/>
+          </a:prstGeom>
+          <a:ln w="317500">
+            <a:solidFill>
+              <a:srgbClr val="FFCC33"/>
+            </a:solidFill>
+          </a:ln>
+        </p:spPr>
+        <p:style>
+          <a:lnRef idx="1">
+            <a:schemeClr val="accent1"/>
+          </a:lnRef>
+          <a:fillRef idx="0">
+            <a:schemeClr val="accent1"/>
+          </a:fillRef>
+          <a:effectRef idx="0">
+            <a:schemeClr val="accent1"/>
+          </a:effectRef>
+          <a:fontRef idx="minor">
+            <a:schemeClr val="tx1"/>
+          </a:fontRef>
+        </p:style>
+      </p:cxnSp>
+      <p:cxnSp>
+        <p:nvCxnSpPr>
+          <p:cNvPr id="20" name="Straight Connector 19">
+            <a:extLst>
+              <a:ext uri="{FF2B5EF4-FFF2-40B4-BE49-F238E27FC236}">
+                <a16:creationId xmlns:a16="http://schemas.microsoft.com/office/drawing/2014/main" id="{F519B408-7CB2-18A4-6EE8-BB75E702A55B}"/>
+              </a:ext>
+            </a:extLst>
+          </p:cNvPr>
+          <p:cNvCxnSpPr>
+            <a:cxnSpLocks/>
+          </p:cNvCxnSpPr>
+          <p:nvPr/>
+        </p:nvCxnSpPr>
+        <p:spPr>
+          <a:xfrm>
+            <a:off x="14528802" y="8363415"/>
+            <a:ext cx="2141413" cy="1212899"/>
+          </a:xfrm>
+          <a:prstGeom prst="line">
+            <a:avLst/>
+          </a:prstGeom>
+          <a:ln w="317500">
+            <a:solidFill>
+              <a:srgbClr val="FFCC33"/>
+            </a:solidFill>
+          </a:ln>
+        </p:spPr>
+        <p:style>
+          <a:lnRef idx="1">
+            <a:schemeClr val="accent1"/>
+          </a:lnRef>
+          <a:fillRef idx="0">
+            <a:schemeClr val="accent1"/>
+          </a:fillRef>
+          <a:effectRef idx="0">
+            <a:schemeClr val="accent1"/>
+          </a:effectRef>
+          <a:fontRef idx="minor">
+            <a:schemeClr val="tx1"/>
+          </a:fontRef>
+        </p:style>
+      </p:cxnSp>
+      <p:sp>
+        <p:nvSpPr>
+          <p:cNvPr id="29" name="Rectangle 28">
+            <a:extLst>
+              <a:ext uri="{FF2B5EF4-FFF2-40B4-BE49-F238E27FC236}">
+                <a16:creationId xmlns:a16="http://schemas.microsoft.com/office/drawing/2014/main" id="{4B0514B0-1D29-BC70-5DC5-6F39D603B6AC}"/>
+              </a:ext>
+            </a:extLst>
+          </p:cNvPr>
+          <p:cNvSpPr/>
+          <p:nvPr/>
+        </p:nvSpPr>
+        <p:spPr>
+          <a:xfrm rot="20272484">
+            <a:off x="6703752" y="968476"/>
+            <a:ext cx="13425285" cy="11214757"/>
+          </a:xfrm>
+          <a:prstGeom prst="rect">
+            <a:avLst/>
+          </a:prstGeom>
+          <a:noFill/>
+        </p:spPr>
+        <p:txBody>
+          <a:bodyPr wrap="none" lIns="91440" tIns="45720" rIns="91440" bIns="45720">
+            <a:prstTxWarp prst="textArchUp">
+              <a:avLst>
+                <a:gd name="adj" fmla="val 11957388"/>
+              </a:avLst>
+            </a:prstTxWarp>
+            <a:spAutoFit/>
+          </a:bodyPr>
+          <a:lstStyle/>
+          <a:p>
+            <a:r>
+              <a:rPr lang="en-US" sz="5400" b="1" dirty="0">
+                <a:solidFill>
+                  <a:srgbClr val="780019"/>
+                </a:solidFill>
+                <a:latin typeface="Trebuchet MS" panose="020B0703020202090204" pitchFamily="34" charset="0"/>
+                <a:cs typeface="Aharoni" panose="02010803020104030203" pitchFamily="2" charset="-79"/>
+              </a:rPr>
+              <a:t>Molecular Phenomena </a:t>
+            </a:r>
+          </a:p>
+          <a:p>
+            <a:r>
+              <a:rPr lang="en-US" sz="5400" b="1" dirty="0">
+                <a:solidFill>
+                  <a:srgbClr val="780019"/>
+                </a:solidFill>
+                <a:latin typeface="Trebuchet MS" panose="020B0703020202090204" pitchFamily="34" charset="0"/>
+                <a:cs typeface="Aharoni" panose="02010803020104030203" pitchFamily="2" charset="-79"/>
+              </a:rPr>
+              <a:t>in Aqueous Systems</a:t>
+            </a:r>
+          </a:p>
+        </p:txBody>
+      </p:sp>
+      <p:sp>
+        <p:nvSpPr>
+          <p:cNvPr id="34" name="Graphic 13" descr="Wrench with solid fill">
+            <a:extLst>
+              <a:ext uri="{FF2B5EF4-FFF2-40B4-BE49-F238E27FC236}">
+                <a16:creationId xmlns:a16="http://schemas.microsoft.com/office/drawing/2014/main" id="{24B74F1D-77F8-D831-A62B-93F054CD3918}"/>
+              </a:ext>
+            </a:extLst>
+          </p:cNvPr>
+          <p:cNvSpPr/>
+          <p:nvPr/>
+        </p:nvSpPr>
+        <p:spPr>
+          <a:xfrm rot="225578">
+            <a:off x="7250145" y="9364160"/>
+            <a:ext cx="919635" cy="952900"/>
+          </a:xfrm>
+          <a:custGeom>
+            <a:avLst/>
+            <a:gdLst>
+              <a:gd name="connsiteX0" fmla="*/ 743490 w 837374"/>
+              <a:gd name="connsiteY0" fmla="*/ 180766 h 839686"/>
+              <a:gd name="connsiteX1" fmla="*/ 675862 w 837374"/>
+              <a:gd name="connsiteY1" fmla="*/ 162668 h 839686"/>
+              <a:gd name="connsiteX2" fmla="*/ 657765 w 837374"/>
+              <a:gd name="connsiteY2" fmla="*/ 95041 h 839686"/>
+              <a:gd name="connsiteX3" fmla="*/ 743490 w 837374"/>
+              <a:gd name="connsiteY3" fmla="*/ 9316 h 839686"/>
+              <a:gd name="connsiteX4" fmla="*/ 593947 w 837374"/>
+              <a:gd name="connsiteY4" fmla="*/ 37891 h 839686"/>
+              <a:gd name="connsiteX5" fmla="*/ 552037 w 837374"/>
+              <a:gd name="connsiteY5" fmla="*/ 183623 h 839686"/>
+              <a:gd name="connsiteX6" fmla="*/ 182467 w 837374"/>
+              <a:gd name="connsiteY6" fmla="*/ 553194 h 839686"/>
+              <a:gd name="connsiteX7" fmla="*/ 37687 w 837374"/>
+              <a:gd name="connsiteY7" fmla="*/ 596056 h 839686"/>
+              <a:gd name="connsiteX8" fmla="*/ 9112 w 837374"/>
+              <a:gd name="connsiteY8" fmla="*/ 744646 h 839686"/>
+              <a:gd name="connsiteX9" fmla="*/ 94837 w 837374"/>
+              <a:gd name="connsiteY9" fmla="*/ 658921 h 839686"/>
+              <a:gd name="connsiteX10" fmla="*/ 161512 w 837374"/>
+              <a:gd name="connsiteY10" fmla="*/ 677019 h 839686"/>
+              <a:gd name="connsiteX11" fmla="*/ 179610 w 837374"/>
+              <a:gd name="connsiteY11" fmla="*/ 744646 h 839686"/>
+              <a:gd name="connsiteX12" fmla="*/ 93885 w 837374"/>
+              <a:gd name="connsiteY12" fmla="*/ 830371 h 839686"/>
+              <a:gd name="connsiteX13" fmla="*/ 243427 w 837374"/>
+              <a:gd name="connsiteY13" fmla="*/ 801796 h 839686"/>
+              <a:gd name="connsiteX14" fmla="*/ 285337 w 837374"/>
+              <a:gd name="connsiteY14" fmla="*/ 656064 h 839686"/>
+              <a:gd name="connsiteX15" fmla="*/ 654907 w 837374"/>
+              <a:gd name="connsiteY15" fmla="*/ 286493 h 839686"/>
+              <a:gd name="connsiteX16" fmla="*/ 799687 w 837374"/>
+              <a:gd name="connsiteY16" fmla="*/ 243631 h 839686"/>
+              <a:gd name="connsiteX17" fmla="*/ 828262 w 837374"/>
+              <a:gd name="connsiteY17" fmla="*/ 95041 h 839686"/>
+              <a:gd name="connsiteX18" fmla="*/ 743490 w 837374"/>
+              <a:gd name="connsiteY18" fmla="*/ 180766 h 839686"/>
+            </a:gdLst>
+            <a:ahLst/>
+            <a:cxnLst>
+              <a:cxn ang="0">
+                <a:pos x="connsiteX0" y="connsiteY0"/>
+              </a:cxn>
+              <a:cxn ang="0">
+                <a:pos x="connsiteX1" y="connsiteY1"/>
+              </a:cxn>
+              <a:cxn ang="0">
+                <a:pos x="connsiteX2" y="connsiteY2"/>
+              </a:cxn>
+              <a:cxn ang="0">
+                <a:pos x="connsiteX3" y="connsiteY3"/>
+              </a:cxn>
+              <a:cxn ang="0">
+                <a:pos x="connsiteX4" y="connsiteY4"/>
+              </a:cxn>
+              <a:cxn ang="0">
+                <a:pos x="connsiteX5" y="connsiteY5"/>
+              </a:cxn>
+              <a:cxn ang="0">
+                <a:pos x="connsiteX6" y="connsiteY6"/>
+              </a:cxn>
+              <a:cxn ang="0">
+                <a:pos x="connsiteX7" y="connsiteY7"/>
+              </a:cxn>
+              <a:cxn ang="0">
+                <a:pos x="connsiteX8" y="connsiteY8"/>
+              </a:cxn>
+              <a:cxn ang="0">
+                <a:pos x="connsiteX9" y="connsiteY9"/>
+              </a:cxn>
+              <a:cxn ang="0">
+                <a:pos x="connsiteX10" y="connsiteY10"/>
+              </a:cxn>
+              <a:cxn ang="0">
+                <a:pos x="connsiteX11" y="connsiteY11"/>
+              </a:cxn>
+              <a:cxn ang="0">
+                <a:pos x="connsiteX12" y="connsiteY12"/>
+              </a:cxn>
+              <a:cxn ang="0">
+                <a:pos x="connsiteX13" y="connsiteY13"/>
+              </a:cxn>
+              <a:cxn ang="0">
+                <a:pos x="connsiteX14" y="connsiteY14"/>
+              </a:cxn>
+              <a:cxn ang="0">
+                <a:pos x="connsiteX15" y="connsiteY15"/>
+              </a:cxn>
+              <a:cxn ang="0">
+                <a:pos x="connsiteX16" y="connsiteY16"/>
+              </a:cxn>
+              <a:cxn ang="0">
+                <a:pos x="connsiteX17" y="connsiteY17"/>
+              </a:cxn>
+              <a:cxn ang="0">
+                <a:pos x="connsiteX18" y="connsiteY18"/>
+              </a:cxn>
+            </a:cxnLst>
+            <a:rect l="l" t="t" r="r" b="b"/>
+            <a:pathLst>
+              <a:path w="837374" h="839686">
+                <a:moveTo>
+                  <a:pt x="743490" y="180766"/>
+                </a:moveTo>
+                <a:lnTo>
+                  <a:pt x="675862" y="162668"/>
+                </a:lnTo>
+                <a:lnTo>
+                  <a:pt x="657765" y="95041"/>
+                </a:lnTo>
+                <a:lnTo>
+                  <a:pt x="743490" y="9316"/>
+                </a:lnTo>
+                <a:cubicBezTo>
+                  <a:pt x="692055" y="-9734"/>
+                  <a:pt x="634905" y="743"/>
+                  <a:pt x="593947" y="37891"/>
+                </a:cubicBezTo>
+                <a:cubicBezTo>
+                  <a:pt x="553942" y="75038"/>
+                  <a:pt x="536797" y="131236"/>
+                  <a:pt x="552037" y="183623"/>
+                </a:cubicBezTo>
+                <a:lnTo>
+                  <a:pt x="182467" y="553194"/>
+                </a:lnTo>
+                <a:cubicBezTo>
+                  <a:pt x="130080" y="538906"/>
+                  <a:pt x="73882" y="556051"/>
+                  <a:pt x="37687" y="596056"/>
+                </a:cubicBezTo>
+                <a:cubicBezTo>
+                  <a:pt x="1492" y="636061"/>
+                  <a:pt x="-9938" y="693211"/>
+                  <a:pt x="9112" y="744646"/>
+                </a:cubicBezTo>
+                <a:lnTo>
+                  <a:pt x="94837" y="658921"/>
+                </a:lnTo>
+                <a:lnTo>
+                  <a:pt x="161512" y="677019"/>
+                </a:lnTo>
+                <a:lnTo>
+                  <a:pt x="179610" y="744646"/>
+                </a:lnTo>
+                <a:lnTo>
+                  <a:pt x="93885" y="830371"/>
+                </a:lnTo>
+                <a:cubicBezTo>
+                  <a:pt x="145320" y="849421"/>
+                  <a:pt x="202470" y="838944"/>
+                  <a:pt x="243427" y="801796"/>
+                </a:cubicBezTo>
+                <a:cubicBezTo>
+                  <a:pt x="283432" y="764648"/>
+                  <a:pt x="300577" y="708451"/>
+                  <a:pt x="285337" y="656064"/>
+                </a:cubicBezTo>
+                <a:lnTo>
+                  <a:pt x="654907" y="286493"/>
+                </a:lnTo>
+                <a:cubicBezTo>
+                  <a:pt x="707295" y="300781"/>
+                  <a:pt x="763492" y="283636"/>
+                  <a:pt x="799687" y="243631"/>
+                </a:cubicBezTo>
+                <a:cubicBezTo>
+                  <a:pt x="835882" y="203626"/>
+                  <a:pt x="847312" y="146476"/>
+                  <a:pt x="828262" y="95041"/>
+                </a:cubicBezTo>
+                <a:lnTo>
+                  <a:pt x="743490" y="180766"/>
+                </a:lnTo>
+                <a:close/>
+              </a:path>
+            </a:pathLst>
+          </a:custGeom>
+          <a:solidFill>
+            <a:srgbClr val="780019"/>
+          </a:solidFill>
+          <a:ln w="9525" cap="flat">
+            <a:noFill/>
+            <a:prstDash val="solid"/>
+            <a:miter/>
+          </a:ln>
+        </p:spPr>
+        <p:txBody>
+          <a:bodyPr rtlCol="0" anchor="ctr"/>
+          <a:lstStyle/>
+          <a:p>
+            <a:endParaRPr lang="en-US" sz="4516" dirty="0"/>
+          </a:p>
+        </p:txBody>
+      </p:sp>
+      <p:sp>
+        <p:nvSpPr>
+          <p:cNvPr id="35" name="Graphic 13" descr="Wrench with solid fill">
+            <a:extLst>
+              <a:ext uri="{FF2B5EF4-FFF2-40B4-BE49-F238E27FC236}">
+                <a16:creationId xmlns:a16="http://schemas.microsoft.com/office/drawing/2014/main" id="{627D092C-315D-66E2-8C6D-03AAA49B1D19}"/>
+              </a:ext>
+            </a:extLst>
+          </p:cNvPr>
+          <p:cNvSpPr/>
+          <p:nvPr/>
+        </p:nvSpPr>
+        <p:spPr>
+          <a:xfrm rot="20822122" flipH="1">
+            <a:off x="14851981" y="9193679"/>
+            <a:ext cx="919634" cy="952900"/>
+          </a:xfrm>
+          <a:custGeom>
+            <a:avLst/>
+            <a:gdLst>
+              <a:gd name="connsiteX0" fmla="*/ 743490 w 837374"/>
+              <a:gd name="connsiteY0" fmla="*/ 180766 h 839686"/>
+              <a:gd name="connsiteX1" fmla="*/ 675862 w 837374"/>
+              <a:gd name="connsiteY1" fmla="*/ 162668 h 839686"/>
+              <a:gd name="connsiteX2" fmla="*/ 657765 w 837374"/>
+              <a:gd name="connsiteY2" fmla="*/ 95041 h 839686"/>
+              <a:gd name="connsiteX3" fmla="*/ 743490 w 837374"/>
+              <a:gd name="connsiteY3" fmla="*/ 9316 h 839686"/>
+              <a:gd name="connsiteX4" fmla="*/ 593947 w 837374"/>
+              <a:gd name="connsiteY4" fmla="*/ 37891 h 839686"/>
+              <a:gd name="connsiteX5" fmla="*/ 552037 w 837374"/>
+              <a:gd name="connsiteY5" fmla="*/ 183623 h 839686"/>
+              <a:gd name="connsiteX6" fmla="*/ 182467 w 837374"/>
+              <a:gd name="connsiteY6" fmla="*/ 553194 h 839686"/>
+              <a:gd name="connsiteX7" fmla="*/ 37687 w 837374"/>
+              <a:gd name="connsiteY7" fmla="*/ 596056 h 839686"/>
+              <a:gd name="connsiteX8" fmla="*/ 9112 w 837374"/>
+              <a:gd name="connsiteY8" fmla="*/ 744646 h 839686"/>
+              <a:gd name="connsiteX9" fmla="*/ 94837 w 837374"/>
+              <a:gd name="connsiteY9" fmla="*/ 658921 h 839686"/>
+              <a:gd name="connsiteX10" fmla="*/ 161512 w 837374"/>
+              <a:gd name="connsiteY10" fmla="*/ 677019 h 839686"/>
+              <a:gd name="connsiteX11" fmla="*/ 179610 w 837374"/>
+              <a:gd name="connsiteY11" fmla="*/ 744646 h 839686"/>
+              <a:gd name="connsiteX12" fmla="*/ 93885 w 837374"/>
+              <a:gd name="connsiteY12" fmla="*/ 830371 h 839686"/>
+              <a:gd name="connsiteX13" fmla="*/ 243427 w 837374"/>
+              <a:gd name="connsiteY13" fmla="*/ 801796 h 839686"/>
+              <a:gd name="connsiteX14" fmla="*/ 285337 w 837374"/>
+              <a:gd name="connsiteY14" fmla="*/ 656064 h 839686"/>
+              <a:gd name="connsiteX15" fmla="*/ 654907 w 837374"/>
+              <a:gd name="connsiteY15" fmla="*/ 286493 h 839686"/>
+              <a:gd name="connsiteX16" fmla="*/ 799687 w 837374"/>
+              <a:gd name="connsiteY16" fmla="*/ 243631 h 839686"/>
+              <a:gd name="connsiteX17" fmla="*/ 828262 w 837374"/>
+              <a:gd name="connsiteY17" fmla="*/ 95041 h 839686"/>
+              <a:gd name="connsiteX18" fmla="*/ 743490 w 837374"/>
+              <a:gd name="connsiteY18" fmla="*/ 180766 h 839686"/>
+            </a:gdLst>
+            <a:ahLst/>
+            <a:cxnLst>
+              <a:cxn ang="0">
+                <a:pos x="connsiteX0" y="connsiteY0"/>
+              </a:cxn>
+              <a:cxn ang="0">
+                <a:pos x="connsiteX1" y="connsiteY1"/>
+              </a:cxn>
+              <a:cxn ang="0">
+                <a:pos x="connsiteX2" y="connsiteY2"/>
+              </a:cxn>
+              <a:cxn ang="0">
+                <a:pos x="connsiteX3" y="connsiteY3"/>
+              </a:cxn>
+              <a:cxn ang="0">
+                <a:pos x="connsiteX4" y="connsiteY4"/>
+              </a:cxn>
+              <a:cxn ang="0">
+                <a:pos x="connsiteX5" y="connsiteY5"/>
+              </a:cxn>
+              <a:cxn ang="0">
+                <a:pos x="connsiteX6" y="connsiteY6"/>
+              </a:cxn>
+              <a:cxn ang="0">
+                <a:pos x="connsiteX7" y="connsiteY7"/>
+              </a:cxn>
+              <a:cxn ang="0">
+                <a:pos x="connsiteX8" y="connsiteY8"/>
+              </a:cxn>
+              <a:cxn ang="0">
+                <a:pos x="connsiteX9" y="connsiteY9"/>
+              </a:cxn>
+              <a:cxn ang="0">
+                <a:pos x="connsiteX10" y="connsiteY10"/>
+              </a:cxn>
+              <a:cxn ang="0">
+                <a:pos x="connsiteX11" y="connsiteY11"/>
+              </a:cxn>
+              <a:cxn ang="0">
+                <a:pos x="connsiteX12" y="connsiteY12"/>
+              </a:cxn>
+              <a:cxn ang="0">
+                <a:pos x="connsiteX13" y="connsiteY13"/>
+              </a:cxn>
+              <a:cxn ang="0">
+                <a:pos x="connsiteX14" y="connsiteY14"/>
+              </a:cxn>
+              <a:cxn ang="0">
+                <a:pos x="connsiteX15" y="connsiteY15"/>
+              </a:cxn>
+              <a:cxn ang="0">
+                <a:pos x="connsiteX16" y="connsiteY16"/>
+              </a:cxn>
+              <a:cxn ang="0">
+                <a:pos x="connsiteX17" y="connsiteY17"/>
+              </a:cxn>
+              <a:cxn ang="0">
+                <a:pos x="connsiteX18" y="connsiteY18"/>
+              </a:cxn>
+            </a:cxnLst>
+            <a:rect l="l" t="t" r="r" b="b"/>
+            <a:pathLst>
+              <a:path w="837374" h="839686">
+                <a:moveTo>
+                  <a:pt x="743490" y="180766"/>
+                </a:moveTo>
+                <a:lnTo>
+                  <a:pt x="675862" y="162668"/>
+                </a:lnTo>
+                <a:lnTo>
+                  <a:pt x="657765" y="95041"/>
+                </a:lnTo>
+                <a:lnTo>
+                  <a:pt x="743490" y="9316"/>
+                </a:lnTo>
+                <a:cubicBezTo>
+                  <a:pt x="692055" y="-9734"/>
+                  <a:pt x="634905" y="743"/>
+                  <a:pt x="593947" y="37891"/>
+                </a:cubicBezTo>
+                <a:cubicBezTo>
+                  <a:pt x="553942" y="75038"/>
+                  <a:pt x="536797" y="131236"/>
+                  <a:pt x="552037" y="183623"/>
+                </a:cubicBezTo>
+                <a:lnTo>
+                  <a:pt x="182467" y="553194"/>
+                </a:lnTo>
+                <a:cubicBezTo>
+                  <a:pt x="130080" y="538906"/>
+                  <a:pt x="73882" y="556051"/>
+                  <a:pt x="37687" y="596056"/>
+                </a:cubicBezTo>
+                <a:cubicBezTo>
+                  <a:pt x="1492" y="636061"/>
+                  <a:pt x="-9938" y="693211"/>
+                  <a:pt x="9112" y="744646"/>
+                </a:cubicBezTo>
+                <a:lnTo>
+                  <a:pt x="94837" y="658921"/>
+                </a:lnTo>
+                <a:lnTo>
+                  <a:pt x="161512" y="677019"/>
+                </a:lnTo>
+                <a:lnTo>
+                  <a:pt x="179610" y="744646"/>
+                </a:lnTo>
+                <a:lnTo>
+                  <a:pt x="93885" y="830371"/>
+                </a:lnTo>
+                <a:cubicBezTo>
+                  <a:pt x="145320" y="849421"/>
+                  <a:pt x="202470" y="838944"/>
+                  <a:pt x="243427" y="801796"/>
+                </a:cubicBezTo>
+                <a:cubicBezTo>
+                  <a:pt x="283432" y="764648"/>
+                  <a:pt x="300577" y="708451"/>
+                  <a:pt x="285337" y="656064"/>
+                </a:cubicBezTo>
+                <a:lnTo>
+                  <a:pt x="654907" y="286493"/>
+                </a:lnTo>
+                <a:cubicBezTo>
+                  <a:pt x="707295" y="300781"/>
+                  <a:pt x="763492" y="283636"/>
+                  <a:pt x="799687" y="243631"/>
+                </a:cubicBezTo>
+                <a:cubicBezTo>
+                  <a:pt x="835882" y="203626"/>
+                  <a:pt x="847312" y="146476"/>
+                  <a:pt x="828262" y="95041"/>
+                </a:cubicBezTo>
+                <a:lnTo>
+                  <a:pt x="743490" y="180766"/>
+                </a:lnTo>
+                <a:close/>
+              </a:path>
+            </a:pathLst>
+          </a:custGeom>
+          <a:solidFill>
+            <a:srgbClr val="780019"/>
+          </a:solidFill>
+          <a:ln w="9525" cap="flat">
+            <a:noFill/>
+            <a:prstDash val="solid"/>
+            <a:miter/>
+          </a:ln>
+        </p:spPr>
+        <p:txBody>
+          <a:bodyPr rtlCol="0" anchor="ctr"/>
+          <a:lstStyle/>
+          <a:p>
+            <a:endParaRPr lang="en-US" sz="4516" dirty="0"/>
+          </a:p>
+        </p:txBody>
+      </p:sp>
+      <p:pic>
+        <p:nvPicPr>
+          <p:cNvPr id="36" name="Graphic 35" descr="Lightbulb and gear with solid fill">
+            <a:extLst>
+              <a:ext uri="{FF2B5EF4-FFF2-40B4-BE49-F238E27FC236}">
+                <a16:creationId xmlns:a16="http://schemas.microsoft.com/office/drawing/2014/main" id="{9DFB0AB6-418A-4CF3-8DD6-CCE64CCE9FD3}"/>
+              </a:ext>
+            </a:extLst>
+          </p:cNvPr>
+          <p:cNvPicPr>
+            <a:picLocks noChangeAspect="1"/>
+          </p:cNvPicPr>
+          <p:nvPr/>
+        </p:nvPicPr>
+        <p:blipFill>
+          <a:blip r:embed="rId3">
+            <a:extLst>
+              <a:ext uri="{28A0092B-C50C-407E-A947-70E740481C1C}">
+                <a14:useLocalDpi xmlns:a14="http://schemas.microsoft.com/office/drawing/2010/main" val="0"/>
+              </a:ext>
+              <a:ext uri="{96DAC541-7B7A-43D3-8B79-37D633B846F1}">
+                <asvg:svgBlip xmlns:asvg="http://schemas.microsoft.com/office/drawing/2016/SVG/main" r:embed="rId4"/>
+              </a:ext>
+            </a:extLst>
+          </a:blip>
+          <a:stretch>
+            <a:fillRect/>
+          </a:stretch>
+        </p:blipFill>
+        <p:spPr>
+          <a:xfrm rot="2342030">
+            <a:off x="12371291" y="786971"/>
+            <a:ext cx="1194390" cy="1235417"/>
+          </a:xfrm>
+          <a:prstGeom prst="rect">
+            <a:avLst/>
+          </a:prstGeom>
+        </p:spPr>
+      </p:pic>
+      <p:pic>
+        <p:nvPicPr>
+          <p:cNvPr id="37" name="Graphic 36" descr="Search Inventory with solid fill">
+            <a:extLst>
+              <a:ext uri="{FF2B5EF4-FFF2-40B4-BE49-F238E27FC236}">
+                <a16:creationId xmlns:a16="http://schemas.microsoft.com/office/drawing/2014/main" id="{4498F449-5431-4E6C-CDB0-FB66FC04305C}"/>
+              </a:ext>
+            </a:extLst>
+          </p:cNvPr>
+          <p:cNvPicPr>
+            <a:picLocks noChangeAspect="1"/>
+          </p:cNvPicPr>
+          <p:nvPr/>
+        </p:nvPicPr>
+        <p:blipFill>
+          <a:blip r:embed="rId5">
+            <a:extLst>
+              <a:ext uri="{28A0092B-C50C-407E-A947-70E740481C1C}">
+                <a14:useLocalDpi xmlns:a14="http://schemas.microsoft.com/office/drawing/2010/main" val="0"/>
+              </a:ext>
+              <a:ext uri="{96DAC541-7B7A-43D3-8B79-37D633B846F1}">
+                <asvg:svgBlip xmlns:asvg="http://schemas.microsoft.com/office/drawing/2016/SVG/main" r:embed="rId6"/>
+              </a:ext>
+            </a:extLst>
+          </a:blip>
+          <a:stretch>
+            <a:fillRect/>
+          </a:stretch>
+        </p:blipFill>
+        <p:spPr>
+          <a:xfrm rot="19319675">
+            <a:off x="9867565" y="905105"/>
+            <a:ext cx="1015370" cy="1033448"/>
+          </a:xfrm>
+          <a:prstGeom prst="rect">
+            <a:avLst/>
+          </a:prstGeom>
+        </p:spPr>
+      </p:pic>
+      <p:pic>
+        <p:nvPicPr>
+          <p:cNvPr id="38" name="Graphic 37" descr="Lightbulb and gear with solid fill">
+            <a:extLst>
+              <a:ext uri="{FF2B5EF4-FFF2-40B4-BE49-F238E27FC236}">
+                <a16:creationId xmlns:a16="http://schemas.microsoft.com/office/drawing/2014/main" id="{F646B456-BA47-072D-EEAF-9F4F0ADF06DC}"/>
+              </a:ext>
+            </a:extLst>
+          </p:cNvPr>
+          <p:cNvPicPr>
+            <a:picLocks noChangeAspect="1"/>
+          </p:cNvPicPr>
+          <p:nvPr/>
+        </p:nvPicPr>
+        <p:blipFill>
+          <a:blip r:embed="rId3">
+            <a:extLst>
+              <a:ext uri="{28A0092B-C50C-407E-A947-70E740481C1C}">
+                <a14:useLocalDpi xmlns:a14="http://schemas.microsoft.com/office/drawing/2010/main" val="0"/>
+              </a:ext>
+              <a:ext uri="{96DAC541-7B7A-43D3-8B79-37D633B846F1}">
+                <asvg:svgBlip xmlns:asvg="http://schemas.microsoft.com/office/drawing/2016/SVG/main" r:embed="rId4"/>
+              </a:ext>
+            </a:extLst>
+          </a:blip>
+          <a:stretch>
+            <a:fillRect/>
+          </a:stretch>
+        </p:blipFill>
+        <p:spPr>
+          <a:xfrm rot="6712092">
+            <a:off x="15888316" y="7421731"/>
+            <a:ext cx="1194390" cy="1235417"/>
+          </a:xfrm>
+          <a:prstGeom prst="rect">
+            <a:avLst/>
+          </a:prstGeom>
+        </p:spPr>
+      </p:pic>
+      <p:pic>
+        <p:nvPicPr>
+          <p:cNvPr id="39" name="Graphic 38" descr="Search Inventory with solid fill">
+            <a:extLst>
+              <a:ext uri="{FF2B5EF4-FFF2-40B4-BE49-F238E27FC236}">
+                <a16:creationId xmlns:a16="http://schemas.microsoft.com/office/drawing/2014/main" id="{96B0A644-19A4-23A3-A5F6-4780404E835F}"/>
+              </a:ext>
+            </a:extLst>
+          </p:cNvPr>
+          <p:cNvPicPr>
+            <a:picLocks noChangeAspect="1"/>
+          </p:cNvPicPr>
+          <p:nvPr/>
+        </p:nvPicPr>
+        <p:blipFill>
+          <a:blip r:embed="rId5">
+            <a:extLst>
+              <a:ext uri="{28A0092B-C50C-407E-A947-70E740481C1C}">
+                <a14:useLocalDpi xmlns:a14="http://schemas.microsoft.com/office/drawing/2010/main" val="0"/>
+              </a:ext>
+              <a:ext uri="{96DAC541-7B7A-43D3-8B79-37D633B846F1}">
+                <asvg:svgBlip xmlns:asvg="http://schemas.microsoft.com/office/drawing/2016/SVG/main" r:embed="rId6"/>
+              </a:ext>
+            </a:extLst>
+          </a:blip>
+          <a:stretch>
+            <a:fillRect/>
+          </a:stretch>
+        </p:blipFill>
+        <p:spPr>
+          <a:xfrm rot="17107660">
+            <a:off x="6147313" y="7540418"/>
+            <a:ext cx="1015370" cy="1033448"/>
+          </a:xfrm>
+          <a:prstGeom prst="rect">
+            <a:avLst/>
+          </a:prstGeom>
+        </p:spPr>
+      </p:pic>
+    </p:spTree>
+    <p:extLst>
+      <p:ext uri="{BB962C8B-B14F-4D97-AF65-F5344CB8AC3E}">
+        <p14:creationId xmlns:p14="http://schemas.microsoft.com/office/powerpoint/2010/main" val="1761162257"/>
+      </p:ext>
+    </p:extLst>
+  </p:cSld>
+  <p:clrMapOvr>
+    <a:masterClrMapping/>
+  </p:clrMapOvr>
+</p:sld>
+</file>
+
+<file path=ppt/slides/slide7.xml><?xml version="1.0" encoding="utf-8"?>
 <p:sld xmlns:a="http://schemas.openxmlformats.org/drawingml/2006/main" xmlns:r="http://schemas.openxmlformats.org/officeDocument/2006/relationships" xmlns:p="http://schemas.openxmlformats.org/presentationml/2006/main">
   <p:cSld>
     <p:spTree>

</xml_diff>